<commit_message>
Update SMS Spam Classification.pptx
</commit_message>
<xml_diff>
--- a/SMS Spam Classification.pptx
+++ b/SMS Spam Classification.pptx
@@ -5,13 +5,14 @@
     <p:sldMasterId id="2147483648" r:id="rId1"/>
   </p:sldMasterIdLst>
   <p:notesMasterIdLst>
-    <p:notesMasterId r:id="rId7"/>
+    <p:notesMasterId r:id="rId8"/>
   </p:notesMasterIdLst>
   <p:sldIdLst>
     <p:sldId id="257" r:id="rId3"/>
     <p:sldId id="258" r:id="rId4"/>
-    <p:sldId id="256" r:id="rId5"/>
+    <p:sldId id="261" r:id="rId5"/>
     <p:sldId id="259" r:id="rId6"/>
+    <p:sldId id="262" r:id="rId7"/>
   </p:sldIdLst>
   <p:sldSz cx="12192000" cy="6858000"/>
   <p:notesSz cx="6858000" cy="9144000"/>
@@ -3486,53 +3487,53 @@
           <a:p>
             <a:r>
               <a:rPr lang="en-US" sz="2700">
-                <a:latin typeface="Roboto" panose="02000000000000000000" charset="0"/>
-                <a:cs typeface="Roboto" panose="02000000000000000000" charset="0"/>
+                <a:latin typeface="Roboto" charset="0"/>
+                <a:cs typeface="Roboto" charset="0"/>
               </a:rPr>
               <a:t>Kunal Mallick(24167002)</a:t>
             </a:r>
             <a:endParaRPr lang="en-US" sz="2700">
-              <a:latin typeface="Roboto" panose="02000000000000000000" charset="0"/>
-              <a:cs typeface="Roboto" panose="02000000000000000000" charset="0"/>
+              <a:latin typeface="Roboto" charset="0"/>
+              <a:cs typeface="Roboto" charset="0"/>
             </a:endParaRPr>
           </a:p>
           <a:p>
             <a:r>
               <a:rPr lang="en-US" sz="2700">
-                <a:latin typeface="Roboto" panose="02000000000000000000" charset="0"/>
-                <a:cs typeface="Roboto" panose="02000000000000000000" charset="0"/>
+                <a:latin typeface="Roboto" charset="0"/>
+                <a:cs typeface="Roboto" charset="0"/>
               </a:rPr>
               <a:t>Soham Adhikari(24167029)</a:t>
             </a:r>
             <a:endParaRPr lang="en-US" sz="2700">
-              <a:latin typeface="Roboto" panose="02000000000000000000" charset="0"/>
-              <a:cs typeface="Roboto" panose="02000000000000000000" charset="0"/>
+              <a:latin typeface="Roboto" charset="0"/>
+              <a:cs typeface="Roboto" charset="0"/>
             </a:endParaRPr>
           </a:p>
           <a:p>
             <a:r>
               <a:rPr lang="en-US" sz="2700">
-                <a:latin typeface="Roboto" panose="02000000000000000000" charset="0"/>
-                <a:cs typeface="Roboto" panose="02000000000000000000" charset="0"/>
+                <a:latin typeface="Roboto" charset="0"/>
+                <a:cs typeface="Roboto" charset="0"/>
               </a:rPr>
               <a:t>Anushka Khatua(24167030)</a:t>
             </a:r>
             <a:endParaRPr lang="en-US" sz="2700">
-              <a:latin typeface="Roboto" panose="02000000000000000000" charset="0"/>
-              <a:cs typeface="Roboto" panose="02000000000000000000" charset="0"/>
+              <a:latin typeface="Roboto" charset="0"/>
+              <a:cs typeface="Roboto" charset="0"/>
             </a:endParaRPr>
           </a:p>
           <a:p>
             <a:r>
               <a:rPr lang="en-US" sz="2700">
-                <a:latin typeface="Roboto" panose="02000000000000000000" charset="0"/>
-                <a:cs typeface="Roboto" panose="02000000000000000000" charset="0"/>
+                <a:latin typeface="Roboto" charset="0"/>
+                <a:cs typeface="Roboto" charset="0"/>
               </a:rPr>
               <a:t>Akankhyaa Abhisikta Lenka(241670XX)</a:t>
             </a:r>
             <a:endParaRPr lang="en-US" sz="2700">
-              <a:latin typeface="Roboto" panose="02000000000000000000" charset="0"/>
-              <a:cs typeface="Roboto" panose="02000000000000000000" charset="0"/>
+              <a:latin typeface="Roboto" charset="0"/>
+              <a:cs typeface="Roboto" charset="0"/>
             </a:endParaRPr>
           </a:p>
         </p:txBody>
@@ -3725,14 +3726,14 @@
           <a:p>
             <a:r>
               <a:rPr lang="en-US" sz="3200">
-                <a:latin typeface="Roboto" panose="02000000000000000000" charset="0"/>
-                <a:cs typeface="Roboto" panose="02000000000000000000" charset="0"/>
+                <a:latin typeface="Roboto" charset="0"/>
+                <a:cs typeface="Roboto" charset="0"/>
               </a:rPr>
               <a:t>Using spam.csv dataset from kaggle</a:t>
             </a:r>
             <a:endParaRPr lang="en-US" sz="3200">
-              <a:latin typeface="Roboto" panose="02000000000000000000" charset="0"/>
-              <a:cs typeface="Roboto" panose="02000000000000000000" charset="0"/>
+              <a:latin typeface="Roboto" charset="0"/>
+              <a:cs typeface="Roboto" charset="0"/>
             </a:endParaRPr>
           </a:p>
           <a:p>
@@ -3840,35 +3841,35 @@
             </a:r>
             <a:r>
               <a:rPr lang="en-US">
-                <a:latin typeface="Roboto" panose="02000000000000000000" charset="0"/>
-                <a:cs typeface="Roboto" panose="02000000000000000000" charset="0"/>
+                <a:latin typeface="Roboto" charset="0"/>
+                <a:cs typeface="Roboto" charset="0"/>
               </a:rPr>
               <a:t>: </a:t>
             </a:r>
             <a:endParaRPr lang="en-US">
-              <a:latin typeface="Roboto" panose="02000000000000000000" charset="0"/>
-              <a:cs typeface="Roboto" panose="02000000000000000000" charset="0"/>
+              <a:latin typeface="Roboto" charset="0"/>
+              <a:cs typeface="Roboto" charset="0"/>
             </a:endParaRPr>
           </a:p>
           <a:p>
             <a:pPr algn="l"/>
             <a:r>
               <a:rPr lang="en-US">
-                <a:latin typeface="Roboto" panose="02000000000000000000" charset="0"/>
-                <a:cs typeface="Roboto" panose="02000000000000000000" charset="0"/>
+                <a:latin typeface="Roboto" charset="0"/>
+                <a:cs typeface="Roboto" charset="0"/>
               </a:rPr>
               <a:t>Kaggle - spam.csv</a:t>
             </a:r>
             <a:endParaRPr lang="en-US">
-              <a:latin typeface="Roboto" panose="02000000000000000000" charset="0"/>
-              <a:cs typeface="Roboto" panose="02000000000000000000" charset="0"/>
+              <a:latin typeface="Roboto" charset="0"/>
+              <a:cs typeface="Roboto" charset="0"/>
             </a:endParaRPr>
           </a:p>
           <a:p>
             <a:pPr algn="l"/>
             <a:endParaRPr lang="en-US">
-              <a:latin typeface="Roboto" panose="02000000000000000000" charset="0"/>
-              <a:cs typeface="Roboto" panose="02000000000000000000" charset="0"/>
+              <a:latin typeface="Roboto" charset="0"/>
+              <a:cs typeface="Roboto" charset="0"/>
             </a:endParaRPr>
           </a:p>
         </p:txBody>
@@ -4069,14 +4070,14 @@
             </a:r>
             <a:r>
               <a:rPr lang="en-US">
-                <a:latin typeface="Roboto" panose="02000000000000000000" charset="0"/>
-                <a:cs typeface="Roboto" panose="02000000000000000000" charset="0"/>
+                <a:latin typeface="Roboto" charset="0"/>
+                <a:cs typeface="Roboto" charset="0"/>
               </a:rPr>
               <a:t>:</a:t>
             </a:r>
             <a:endParaRPr lang="en-US">
-              <a:latin typeface="Roboto" panose="02000000000000000000" charset="0"/>
-              <a:cs typeface="Roboto" panose="02000000000000000000" charset="0"/>
+              <a:latin typeface="Roboto" charset="0"/>
+              <a:cs typeface="Roboto" charset="0"/>
             </a:endParaRPr>
           </a:p>
           <a:p>
@@ -4086,14 +4087,14 @@
             </a:pPr>
             <a:r>
               <a:rPr lang="en-US">
-                <a:latin typeface="Roboto" panose="02000000000000000000" charset="0"/>
-                <a:cs typeface="Roboto" panose="02000000000000000000" charset="0"/>
+                <a:latin typeface="Roboto" charset="0"/>
+                <a:cs typeface="Roboto" charset="0"/>
               </a:rPr>
               <a:t>label (ham or spam)</a:t>
             </a:r>
             <a:endParaRPr lang="en-US">
-              <a:latin typeface="Roboto" panose="02000000000000000000" charset="0"/>
-              <a:cs typeface="Roboto" panose="02000000000000000000" charset="0"/>
+              <a:latin typeface="Roboto" charset="0"/>
+              <a:cs typeface="Roboto" charset="0"/>
             </a:endParaRPr>
           </a:p>
           <a:p>
@@ -4103,14 +4104,14 @@
             </a:pPr>
             <a:r>
               <a:rPr lang="en-US">
-                <a:latin typeface="Roboto" panose="02000000000000000000" charset="0"/>
-                <a:cs typeface="Roboto" panose="02000000000000000000" charset="0"/>
+                <a:latin typeface="Roboto" charset="0"/>
+                <a:cs typeface="Roboto" charset="0"/>
               </a:rPr>
               <a:t>message (sms content)</a:t>
             </a:r>
             <a:endParaRPr lang="en-US">
-              <a:latin typeface="Roboto" panose="02000000000000000000" charset="0"/>
-              <a:cs typeface="Roboto" panose="02000000000000000000" charset="0"/>
+              <a:latin typeface="Roboto" charset="0"/>
+              <a:cs typeface="Roboto" charset="0"/>
             </a:endParaRPr>
           </a:p>
         </p:txBody>
@@ -4311,35 +4312,35 @@
             </a:r>
             <a:r>
               <a:rPr lang="en-US">
-                <a:latin typeface="Roboto" panose="02000000000000000000" charset="0"/>
-                <a:cs typeface="Roboto" panose="02000000000000000000" charset="0"/>
+                <a:latin typeface="Roboto" charset="0"/>
+                <a:cs typeface="Roboto" charset="0"/>
               </a:rPr>
               <a:t>:</a:t>
             </a:r>
             <a:endParaRPr lang="en-US">
-              <a:latin typeface="Roboto" panose="02000000000000000000" charset="0"/>
-              <a:cs typeface="Roboto" panose="02000000000000000000" charset="0"/>
+              <a:latin typeface="Roboto" charset="0"/>
+              <a:cs typeface="Roboto" charset="0"/>
             </a:endParaRPr>
           </a:p>
           <a:p>
             <a:pPr algn="l"/>
             <a:r>
               <a:rPr lang="en-US" altLang="en-US">
-                <a:latin typeface="Roboto" panose="02000000000000000000" charset="0"/>
-                <a:cs typeface="Roboto" panose="02000000000000000000" charset="0"/>
+                <a:latin typeface="Roboto" charset="0"/>
+                <a:cs typeface="Roboto" charset="0"/>
               </a:rPr>
               <a:t>5,572 rows, 2 columns</a:t>
             </a:r>
             <a:endParaRPr lang="en-US" altLang="en-US">
-              <a:latin typeface="Roboto" panose="02000000000000000000" charset="0"/>
-              <a:cs typeface="Roboto" panose="02000000000000000000" charset="0"/>
+              <a:latin typeface="Roboto" charset="0"/>
+              <a:cs typeface="Roboto" charset="0"/>
             </a:endParaRPr>
           </a:p>
         </p:txBody>
       </p:sp>
       <p:pic>
         <p:nvPicPr>
-          <p:cNvPr id="4" name="Picture 3" descr="dataset description"/>
+          <p:cNvPr id="5" name="Picture 4" descr="Screenshot 2024-12-03 132706"/>
           <p:cNvPicPr>
             <a:picLocks noChangeAspect="1"/>
           </p:cNvPicPr>
@@ -4353,8 +4354,8 @@
         </p:blipFill>
         <p:spPr>
           <a:xfrm>
-            <a:off x="6263640" y="1720215"/>
-            <a:ext cx="5928360" cy="3947160"/>
+            <a:off x="6838950" y="1468755"/>
+            <a:ext cx="4638675" cy="4838700"/>
           </a:xfrm>
           <a:prstGeom prst="rect">
             <a:avLst/>
@@ -4381,7 +4382,7 @@
       <p:grpSpPr/>
       <p:sp>
         <p:nvSpPr>
-          <p:cNvPr id="2" name="Title 1"/>
+          <p:cNvPr id="4" name="Title 3"/>
           <p:cNvSpPr>
             <a:spLocks noGrp="1"/>
           </p:cNvSpPr>
@@ -4392,7 +4393,7 @@
         <p:spPr>
           <a:xfrm>
             <a:off x="857885" y="657860"/>
-            <a:ext cx="7747000" cy="922655"/>
+            <a:ext cx="2430780" cy="922655"/>
           </a:xfrm>
         </p:spPr>
         <p:txBody>
@@ -4401,11 +4402,20 @@
           </a:bodyPr>
           <a:p>
             <a:r>
+              <a:rPr lang="en-IN" altLang="en-US" sz="4800">
+                <a:latin typeface="Roboto" charset="0"/>
+                <a:cs typeface="Roboto" charset="0"/>
+                <a:sym typeface="+mn-ea"/>
+              </a:rPr>
+              <a:t>L</a:t>
+            </a:r>
+            <a:r>
               <a:rPr lang="en-US" sz="4800">
-                <a:latin typeface="Roboto Medium" panose="02000000000000000000" charset="0"/>
-                <a:cs typeface="Roboto Medium" panose="02000000000000000000" charset="0"/>
+                <a:latin typeface="Roboto" charset="0"/>
+                <a:cs typeface="Roboto" charset="0"/>
+                <a:sym typeface="+mn-ea"/>
               </a:rPr>
-              <a:t>Spam vs Ham Distribution</a:t>
+              <a:t>abel </a:t>
             </a:r>
             <a:endParaRPr lang="en-US" sz="4800">
               <a:latin typeface="Roboto Medium" panose="02000000000000000000" charset="0"/>
@@ -4414,18 +4424,185 @@
           </a:p>
         </p:txBody>
       </p:sp>
-      <p:sp>
-        <p:nvSpPr>
-          <p:cNvPr id="20" name="Subtitle 2"/>
-          <p:cNvSpPr>
-            <a:spLocks noGrp="1"/>
-          </p:cNvSpPr>
+      <p:pic>
+        <p:nvPicPr>
+          <p:cNvPr id="5" name="Picture 4"/>
+          <p:cNvPicPr>
+            <a:picLocks noChangeAspect="1"/>
+          </p:cNvPicPr>
           <p:nvPr/>
-        </p:nvSpPr>
+        </p:nvPicPr>
+        <p:blipFill>
+          <a:blip r:embed="rId1"/>
+          <a:stretch>
+            <a:fillRect/>
+          </a:stretch>
+        </p:blipFill>
         <p:spPr>
           <a:xfrm>
-            <a:off x="1120140" y="4489450"/>
-            <a:ext cx="6916420" cy="1468755"/>
+            <a:off x="4867910" y="2200910"/>
+            <a:ext cx="7164705" cy="4338320"/>
+          </a:xfrm>
+          <a:prstGeom prst="rect">
+            <a:avLst/>
+          </a:prstGeom>
+        </p:spPr>
+      </p:pic>
+      <p:sp>
+        <p:nvSpPr>
+          <p:cNvPr id="6" name="Text Box 5"/>
+          <p:cNvSpPr txBox="1"/>
+          <p:nvPr/>
+        </p:nvSpPr>
+        <p:spPr>
+          <a:xfrm>
+            <a:off x="1085215" y="1784350"/>
+            <a:ext cx="5076190" cy="1383665"/>
+          </a:xfrm>
+          <a:prstGeom prst="rect">
+            <a:avLst/>
+          </a:prstGeom>
+          <a:noFill/>
+        </p:spPr>
+        <p:txBody>
+          <a:bodyPr wrap="square" rtlCol="0">
+            <a:spAutoFit/>
+          </a:bodyPr>
+          <a:p>
+            <a:pPr marL="285750" indent="-285750">
+              <a:buFont typeface="Wingdings" panose="05000000000000000000" charset="0"/>
+              <a:buChar char="Ø"/>
+            </a:pPr>
+            <a:r>
+              <a:rPr lang="en-US" altLang="en-US" sz="2800">
+                <a:latin typeface="Roboto" charset="0"/>
+                <a:cs typeface="Roboto" charset="0"/>
+              </a:rPr>
+              <a:t>Type     </a:t>
+            </a:r>
+            <a:r>
+              <a:rPr lang="en-IN" altLang="en-US" sz="2800">
+                <a:latin typeface="Roboto" charset="0"/>
+                <a:cs typeface="Roboto" charset="0"/>
+              </a:rPr>
+              <a:t>	</a:t>
+            </a:r>
+            <a:r>
+              <a:rPr lang="en-US" altLang="en-US" sz="2800">
+                <a:latin typeface="Roboto" charset="0"/>
+                <a:cs typeface="Roboto" charset="0"/>
+              </a:rPr>
+              <a:t>:   object</a:t>
+            </a:r>
+            <a:endParaRPr lang="en-US" altLang="en-US" sz="2800">
+              <a:latin typeface="Roboto" charset="0"/>
+              <a:cs typeface="Roboto" charset="0"/>
+            </a:endParaRPr>
+          </a:p>
+          <a:p>
+            <a:pPr marL="285750" indent="-285750">
+              <a:buFont typeface="Wingdings" panose="05000000000000000000" charset="0"/>
+              <a:buChar char="Ø"/>
+            </a:pPr>
+            <a:r>
+              <a:rPr lang="en-US" altLang="en-US" sz="2800">
+                <a:latin typeface="Roboto" charset="0"/>
+                <a:cs typeface="Roboto" charset="0"/>
+              </a:rPr>
+              <a:t>unique   </a:t>
+            </a:r>
+            <a:r>
+              <a:rPr lang="en-IN" altLang="en-US" sz="2800">
+                <a:latin typeface="Roboto" charset="0"/>
+                <a:cs typeface="Roboto" charset="0"/>
+              </a:rPr>
+              <a:t>	</a:t>
+            </a:r>
+            <a:r>
+              <a:rPr lang="en-US" altLang="en-US" sz="2800">
+                <a:latin typeface="Roboto" charset="0"/>
+                <a:cs typeface="Roboto" charset="0"/>
+              </a:rPr>
+              <a:t>:   5,169</a:t>
+            </a:r>
+            <a:endParaRPr lang="en-US" altLang="en-US" sz="2800">
+              <a:latin typeface="Roboto" charset="0"/>
+              <a:cs typeface="Roboto" charset="0"/>
+            </a:endParaRPr>
+          </a:p>
+          <a:p>
+            <a:pPr marL="285750" indent="-285750">
+              <a:buFont typeface="Wingdings" panose="05000000000000000000" charset="0"/>
+              <a:buChar char="Ø"/>
+            </a:pPr>
+            <a:r>
+              <a:rPr lang="en-US" altLang="en-US" sz="2800">
+                <a:latin typeface="Roboto" charset="0"/>
+                <a:cs typeface="Roboto" charset="0"/>
+              </a:rPr>
+              <a:t>missing  </a:t>
+            </a:r>
+            <a:r>
+              <a:rPr lang="en-IN" altLang="en-US" sz="2800">
+                <a:latin typeface="Roboto" charset="0"/>
+                <a:cs typeface="Roboto" charset="0"/>
+              </a:rPr>
+              <a:t>	</a:t>
+            </a:r>
+            <a:r>
+              <a:rPr lang="en-US" altLang="en-US" sz="2800">
+                <a:latin typeface="Roboto" charset="0"/>
+                <a:cs typeface="Roboto" charset="0"/>
+              </a:rPr>
+              <a:t>:   </a:t>
+            </a:r>
+            <a:r>
+              <a:rPr lang="en-IN" altLang="en-US" sz="2800">
+                <a:latin typeface="Roboto" charset="0"/>
+                <a:cs typeface="Roboto" charset="0"/>
+              </a:rPr>
+              <a:t>0</a:t>
+            </a:r>
+            <a:r>
+              <a:rPr lang="en-US" altLang="en-US" sz="2800">
+                <a:latin typeface="Roboto" charset="0"/>
+                <a:cs typeface="Roboto" charset="0"/>
+              </a:rPr>
+              <a:t>(0.</a:t>
+            </a:r>
+            <a:r>
+              <a:rPr lang="en-IN" altLang="en-US" sz="2800">
+                <a:latin typeface="Roboto" charset="0"/>
+                <a:cs typeface="Roboto" charset="0"/>
+              </a:rPr>
+              <a:t>0</a:t>
+            </a:r>
+            <a:r>
+              <a:rPr lang="en-US" altLang="en-US" sz="2800">
+                <a:latin typeface="Roboto" charset="0"/>
+                <a:cs typeface="Roboto" charset="0"/>
+              </a:rPr>
+              <a:t>%)</a:t>
+            </a:r>
+            <a:endParaRPr lang="en-US" altLang="en-US" sz="2800">
+              <a:latin typeface="Roboto" charset="0"/>
+              <a:cs typeface="Roboto" charset="0"/>
+            </a:endParaRPr>
+          </a:p>
+        </p:txBody>
+      </p:sp>
+      <p:sp>
+        <p:nvSpPr>
+          <p:cNvPr id="20" name="Subtitle 2"/>
+          <p:cNvSpPr>
+            <a:spLocks noGrp="1"/>
+          </p:cNvSpPr>
+          <p:nvPr/>
+        </p:nvSpPr>
+        <p:spPr>
+          <a:xfrm>
+            <a:off x="1085215" y="3168015"/>
+            <a:ext cx="7637145" cy="1468755"/>
           </a:xfrm>
           <a:prstGeom prst="rect">
             <a:avLst/>
@@ -4601,8 +4778,8 @@
           </a:lstStyle>
           <a:p>
             <a:pPr marL="457200" indent="-457200" algn="l">
-              <a:buFont typeface="Arial" panose="020B0604020202020204" pitchFamily="34" charset="0"/>
-              <a:buChar char="•"/>
+              <a:buFont typeface="Wingdings" panose="05000000000000000000" charset="0"/>
+              <a:buChar char="Ø"/>
             </a:pPr>
             <a:r>
               <a:rPr lang="en-US">
@@ -4612,21 +4789,28 @@
               <a:t>Spam</a:t>
             </a:r>
             <a:r>
+              <a:rPr lang="en-IN" altLang="en-US">
+                <a:latin typeface="Roboto Medium" panose="02000000000000000000" charset="0"/>
+                <a:cs typeface="Roboto Medium" panose="02000000000000000000" charset="0"/>
+              </a:rPr>
+              <a:t>	</a:t>
+            </a:r>
+            <a:r>
               <a:rPr lang="en-US">
-                <a:latin typeface="Roboto" panose="02000000000000000000" charset="0"/>
-                <a:cs typeface="Roboto" panose="02000000000000000000" charset="0"/>
+                <a:latin typeface="Roboto" charset="0"/>
+                <a:cs typeface="Roboto" charset="0"/>
               </a:rPr>
-              <a:t>: 13.4% (747 messages)</a:t>
+              <a:t>: 13.4% (747)</a:t>
             </a:r>
             <a:endParaRPr lang="en-US">
-              <a:latin typeface="Roboto" panose="02000000000000000000" charset="0"/>
-              <a:cs typeface="Roboto" panose="02000000000000000000" charset="0"/>
+              <a:latin typeface="Roboto" charset="0"/>
+              <a:cs typeface="Roboto" charset="0"/>
             </a:endParaRPr>
           </a:p>
           <a:p>
             <a:pPr marL="457200" indent="-457200" algn="l">
-              <a:buFont typeface="Arial" panose="020B0604020202020204" pitchFamily="34" charset="0"/>
-              <a:buChar char="•"/>
+              <a:buFont typeface="Wingdings" panose="05000000000000000000" charset="0"/>
+              <a:buChar char="Ø"/>
             </a:pPr>
             <a:r>
               <a:rPr lang="en-US">
@@ -4637,117 +4821,52 @@
               <a:t>Ham</a:t>
             </a:r>
             <a:r>
-              <a:rPr lang="en-US">
-                <a:latin typeface="Roboto" panose="02000000000000000000" charset="0"/>
-                <a:cs typeface="Roboto" panose="02000000000000000000" charset="0"/>
-                <a:sym typeface="+mn-ea"/>
-              </a:rPr>
-              <a:t>: 86.6% (4,825 messages)</a:t>
-            </a:r>
-            <a:endParaRPr lang="en-US">
-              <a:latin typeface="Roboto" panose="02000000000000000000" charset="0"/>
-              <a:cs typeface="Roboto" panose="02000000000000000000" charset="0"/>
-              <a:sym typeface="+mn-ea"/>
-            </a:endParaRPr>
-          </a:p>
-          <a:p>
-            <a:pPr marL="457200" indent="-457200" algn="l">
-              <a:buFont typeface="Arial" panose="020B0604020202020204" pitchFamily="34" charset="0"/>
-              <a:buChar char="•"/>
-            </a:pPr>
-            <a:r>
-              <a:rPr lang="en-US">
+              <a:rPr lang="en-IN" altLang="en-US">
                 <a:latin typeface="Roboto Medium" panose="02000000000000000000" charset="0"/>
                 <a:cs typeface="Roboto Medium" panose="02000000000000000000" charset="0"/>
                 <a:sym typeface="+mn-ea"/>
               </a:rPr>
-              <a:t>Imbalance: </a:t>
+              <a:t>	</a:t>
             </a:r>
             <a:r>
               <a:rPr lang="en-US">
-                <a:latin typeface="Roboto" panose="02000000000000000000" charset="0"/>
-                <a:cs typeface="Roboto" panose="02000000000000000000" charset="0"/>
+                <a:latin typeface="Roboto" charset="0"/>
+                <a:cs typeface="Roboto" charset="0"/>
                 <a:sym typeface="+mn-ea"/>
               </a:rPr>
-              <a:t>Majority of the messages are ham</a:t>
+              <a:t>: 86.6% (4</a:t>
+            </a:r>
+            <a:r>
+              <a:rPr lang="en-IN" altLang="en-US">
+                <a:latin typeface="Roboto" charset="0"/>
+                <a:cs typeface="Roboto" charset="0"/>
+                <a:sym typeface="+mn-ea"/>
+              </a:rPr>
+              <a:t>,</a:t>
+            </a:r>
+            <a:r>
+              <a:rPr lang="en-US">
+                <a:latin typeface="Roboto" charset="0"/>
+                <a:cs typeface="Roboto" charset="0"/>
+                <a:sym typeface="+mn-ea"/>
+              </a:rPr>
+              <a:t>825 </a:t>
+            </a:r>
+            <a:r>
+              <a:rPr lang="en-US">
+                <a:latin typeface="Roboto" charset="0"/>
+                <a:cs typeface="Roboto" charset="0"/>
+                <a:sym typeface="+mn-ea"/>
+              </a:rPr>
+              <a:t>)</a:t>
             </a:r>
             <a:endParaRPr lang="en-US">
-              <a:latin typeface="Roboto" panose="02000000000000000000" charset="0"/>
-              <a:cs typeface="Roboto" panose="02000000000000000000" charset="0"/>
+              <a:latin typeface="Roboto" charset="0"/>
+              <a:cs typeface="Roboto" charset="0"/>
             </a:endParaRPr>
           </a:p>
-          <a:p>
-            <a:pPr marL="457200" indent="-457200" algn="l">
-              <a:buFont typeface="Arial" panose="020B0604020202020204" pitchFamily="34" charset="0"/>
-              <a:buChar char="•"/>
-            </a:pPr>
-            <a:endParaRPr lang="en-US">
-              <a:latin typeface="Roboto" panose="02000000000000000000" charset="0"/>
-              <a:cs typeface="Roboto" panose="02000000000000000000" charset="0"/>
-            </a:endParaRPr>
-          </a:p>
-          <a:p>
-            <a:pPr marL="457200" indent="-457200" algn="l">
-              <a:buFont typeface="Arial" panose="020B0604020202020204" pitchFamily="34" charset="0"/>
-              <a:buChar char="•"/>
-            </a:pPr>
-            <a:endParaRPr lang="en-US">
-              <a:latin typeface="Roboto" panose="02000000000000000000" charset="0"/>
-              <a:cs typeface="Roboto" panose="02000000000000000000" charset="0"/>
-            </a:endParaRPr>
-          </a:p>
-        </p:txBody>
-      </p:sp>
-      <p:pic>
-        <p:nvPicPr>
-          <p:cNvPr id="24" name="Picture 23" descr="spam vs ham"/>
-          <p:cNvPicPr>
-            <a:picLocks noChangeAspect="1"/>
-          </p:cNvPicPr>
-          <p:nvPr/>
-        </p:nvPicPr>
-        <p:blipFill>
-          <a:blip r:embed="rId1"/>
-          <a:srcRect r="50844"/>
-          <a:stretch>
-            <a:fillRect/>
-          </a:stretch>
-        </p:blipFill>
-        <p:spPr>
-          <a:xfrm>
-            <a:off x="8036560" y="1580515"/>
-            <a:ext cx="3636010" cy="4663440"/>
-          </a:xfrm>
-          <a:prstGeom prst="rect">
-            <a:avLst/>
-          </a:prstGeom>
-        </p:spPr>
-      </p:pic>
-      <p:pic>
-        <p:nvPicPr>
-          <p:cNvPr id="25" name="Picture 24" descr="spam vs ham"/>
-          <p:cNvPicPr>
-            <a:picLocks noChangeAspect="1"/>
-          </p:cNvPicPr>
-          <p:nvPr/>
-        </p:nvPicPr>
-        <p:blipFill>
-          <a:blip r:embed="rId1"/>
-          <a:srcRect l="53897" t="15889" r="1577" b="19417"/>
-          <a:stretch>
-            <a:fillRect/>
-          </a:stretch>
-        </p:blipFill>
-        <p:spPr>
-          <a:xfrm>
-            <a:off x="2407920" y="1580515"/>
-            <a:ext cx="3870960" cy="2865120"/>
-          </a:xfrm>
-          <a:prstGeom prst="rect">
-            <a:avLst/>
-          </a:prstGeom>
-        </p:spPr>
-      </p:pic>
+        </p:txBody>
+      </p:sp>
     </p:spTree>
   </p:cSld>
   <p:clrMapOvr>
@@ -4787,12 +4906,22 @@
             <a:normAutofit/>
           </a:bodyPr>
           <a:p>
+            <a:pPr algn="l"/>
+            <a:r>
+              <a:rPr lang="en-IN" altLang="en-US" sz="4800">
+                <a:latin typeface="Roboto" charset="0"/>
+                <a:cs typeface="Roboto" charset="0"/>
+                <a:sym typeface="+mn-ea"/>
+              </a:rPr>
+              <a:t>M</a:t>
+            </a:r>
             <a:r>
               <a:rPr lang="en-US" sz="4800">
-                <a:latin typeface="Roboto Medium" panose="02000000000000000000" charset="0"/>
-                <a:cs typeface="Roboto Medium" panose="02000000000000000000" charset="0"/>
+                <a:latin typeface="Roboto" charset="0"/>
+                <a:cs typeface="Roboto" charset="0"/>
+                <a:sym typeface="+mn-ea"/>
               </a:rPr>
-              <a:t>Data Insights</a:t>
+              <a:t>essage </a:t>
             </a:r>
             <a:endParaRPr lang="en-US" sz="4800">
               <a:latin typeface="Roboto Medium" panose="02000000000000000000" charset="0"/>
@@ -5016,21 +5145,21 @@
             </a:r>
             <a:r>
               <a:rPr lang="en-US">
-                <a:latin typeface="Roboto" panose="02000000000000000000" charset="0"/>
-                <a:cs typeface="Roboto" panose="02000000000000000000" charset="0"/>
+                <a:latin typeface="Roboto" charset="0"/>
+                <a:cs typeface="Roboto" charset="0"/>
               </a:rPr>
               <a:t>: </a:t>
             </a:r>
             <a:r>
               <a:rPr lang="en-US" altLang="en-US">
-                <a:latin typeface="Roboto" panose="02000000000000000000" charset="0"/>
-                <a:cs typeface="Roboto" panose="02000000000000000000" charset="0"/>
+                <a:latin typeface="Roboto" charset="0"/>
+                <a:cs typeface="Roboto" charset="0"/>
               </a:rPr>
               <a:t>"win", "free", "call"</a:t>
             </a:r>
             <a:endParaRPr lang="en-US" altLang="en-US">
-              <a:latin typeface="Roboto" panose="02000000000000000000" charset="0"/>
-              <a:cs typeface="Roboto" panose="02000000000000000000" charset="0"/>
+              <a:latin typeface="Roboto" charset="0"/>
+              <a:cs typeface="Roboto" charset="0"/>
             </a:endParaRPr>
           </a:p>
           <a:p>
@@ -5048,23 +5177,23 @@
             </a:r>
             <a:r>
               <a:rPr lang="en-US">
-                <a:latin typeface="Roboto" panose="02000000000000000000" charset="0"/>
-                <a:cs typeface="Roboto" panose="02000000000000000000" charset="0"/>
+                <a:latin typeface="Roboto" charset="0"/>
+                <a:cs typeface="Roboto" charset="0"/>
                 <a:sym typeface="+mn-ea"/>
               </a:rPr>
               <a:t>: </a:t>
             </a:r>
             <a:r>
               <a:rPr lang="en-US" altLang="en-US">
-                <a:latin typeface="Roboto" panose="02000000000000000000" charset="0"/>
-                <a:cs typeface="Roboto" panose="02000000000000000000" charset="0"/>
+                <a:latin typeface="Roboto" charset="0"/>
+                <a:cs typeface="Roboto" charset="0"/>
                 <a:sym typeface="+mn-ea"/>
               </a:rPr>
               <a:t>"ok", "good", "know"</a:t>
             </a:r>
             <a:endParaRPr lang="en-US" altLang="en-US">
-              <a:latin typeface="Roboto" panose="02000000000000000000" charset="0"/>
-              <a:cs typeface="Roboto" panose="02000000000000000000" charset="0"/>
+              <a:latin typeface="Roboto" charset="0"/>
+              <a:cs typeface="Roboto" charset="0"/>
               <a:sym typeface="+mn-ea"/>
             </a:endParaRPr>
           </a:p>
@@ -5073,8 +5202,8 @@
               <a:buFont typeface="Arial" panose="020B0604020202020204" pitchFamily="34" charset="0"/>
             </a:pPr>
             <a:endParaRPr lang="en-US">
-              <a:latin typeface="Roboto" panose="02000000000000000000" charset="0"/>
-              <a:cs typeface="Roboto" panose="02000000000000000000" charset="0"/>
+              <a:latin typeface="Roboto" charset="0"/>
+              <a:cs typeface="Roboto" charset="0"/>
             </a:endParaRPr>
           </a:p>
           <a:p>
@@ -5083,8 +5212,8 @@
               <a:buChar char="•"/>
             </a:pPr>
             <a:endParaRPr lang="en-US">
-              <a:latin typeface="Roboto" panose="02000000000000000000" charset="0"/>
-              <a:cs typeface="Roboto" panose="02000000000000000000" charset="0"/>
+              <a:latin typeface="Roboto" charset="0"/>
+              <a:cs typeface="Roboto" charset="0"/>
             </a:endParaRPr>
           </a:p>
         </p:txBody>
@@ -5113,6 +5242,59 @@
           </a:prstGeom>
         </p:spPr>
       </p:pic>
+    </p:spTree>
+  </p:cSld>
+  <p:clrMapOvr>
+    <a:masterClrMapping/>
+  </p:clrMapOvr>
+</p:sld>
+</file>
+
+<file path=ppt/slides/slide5.xml><?xml version="1.0" encoding="utf-8"?>
+<p:sld xmlns:a="http://schemas.openxmlformats.org/drawingml/2006/main" xmlns:r="http://schemas.openxmlformats.org/officeDocument/2006/relationships" xmlns:p="http://schemas.openxmlformats.org/presentationml/2006/main">
+  <p:cSld>
+    <p:spTree>
+      <p:nvGrpSpPr>
+        <p:cNvPr id="1" name=""/>
+        <p:cNvGrpSpPr/>
+        <p:nvPr/>
+      </p:nvGrpSpPr>
+      <p:grpSpPr/>
+      <p:sp>
+        <p:nvSpPr>
+          <p:cNvPr id="4" name="Title 3"/>
+          <p:cNvSpPr>
+            <a:spLocks noGrp="1"/>
+          </p:cNvSpPr>
+          <p:nvPr>
+            <p:ph type="ctrTitle"/>
+          </p:nvPr>
+        </p:nvSpPr>
+        <p:spPr>
+          <a:xfrm>
+            <a:off x="857885" y="393700"/>
+            <a:ext cx="5615305" cy="922655"/>
+          </a:xfrm>
+        </p:spPr>
+        <p:txBody>
+          <a:bodyPr>
+            <a:normAutofit/>
+          </a:bodyPr>
+          <a:p>
+            <a:r>
+              <a:rPr lang="en-US" sz="4800">
+                <a:latin typeface="Roboto Medium" panose="02000000000000000000" charset="0"/>
+                <a:cs typeface="Roboto Medium" panose="02000000000000000000" charset="0"/>
+              </a:rPr>
+              <a:t>Dataset Overview</a:t>
+            </a:r>
+            <a:endParaRPr lang="en-US" sz="4800">
+              <a:latin typeface="Roboto Medium" panose="02000000000000000000" charset="0"/>
+              <a:cs typeface="Roboto Medium" panose="02000000000000000000" charset="0"/>
+            </a:endParaRPr>
+          </a:p>
+        </p:txBody>
+      </p:sp>
     </p:spTree>
   </p:cSld>
   <p:clrMapOvr>

</xml_diff>